<commit_message>
Final slides for h2o world 2015 in 4:3.
</commit_message>
<xml_diff>
--- a/tutorials/building-a-smarter-application/BuildingASmarterApplication.pptx
+++ b/tutorials/building-a-smarter-application/BuildingASmarterApplication.pptx
@@ -5,7 +5,7 @@
     <p:sldMasterId id="2147483660" r:id="rId1"/>
   </p:sldMasterIdLst>
   <p:notesMasterIdLst>
-    <p:notesMasterId r:id="rId22"/>
+    <p:notesMasterId r:id="rId23"/>
   </p:notesMasterIdLst>
   <p:sldIdLst>
     <p:sldId id="256" r:id="rId2"/>
@@ -21,13 +21,14 @@
     <p:sldId id="259" r:id="rId12"/>
     <p:sldId id="271" r:id="rId13"/>
     <p:sldId id="270" r:id="rId14"/>
-    <p:sldId id="275" r:id="rId15"/>
-    <p:sldId id="272" r:id="rId16"/>
-    <p:sldId id="278" r:id="rId17"/>
-    <p:sldId id="279" r:id="rId18"/>
-    <p:sldId id="280" r:id="rId19"/>
-    <p:sldId id="276" r:id="rId20"/>
-    <p:sldId id="281" r:id="rId21"/>
+    <p:sldId id="282" r:id="rId15"/>
+    <p:sldId id="275" r:id="rId16"/>
+    <p:sldId id="272" r:id="rId17"/>
+    <p:sldId id="278" r:id="rId18"/>
+    <p:sldId id="279" r:id="rId19"/>
+    <p:sldId id="280" r:id="rId20"/>
+    <p:sldId id="276" r:id="rId21"/>
+    <p:sldId id="281" r:id="rId22"/>
   </p:sldIdLst>
   <p:sldSz cx="9144000" cy="6858000" type="screen4x3"/>
   <p:notesSz cx="6858000" cy="9144000"/>
@@ -235,7 +236,7 @@
   </p:defaultTextStyle>
   <p:extLst>
     <p:ext uri="{EFAFB233-063F-42B5-8137-9DF3F51BA10A}">
-      <p15:sldGuideLst xmlns:p15="http://schemas.microsoft.com/office/powerpoint/2012/main" xmlns="" xmlns:mv="urn:schemas-microsoft-com:mac:vml" xmlns:mc="http://schemas.openxmlformats.org/markup-compatibility/2006">
+      <p15:sldGuideLst xmlns:mc="http://schemas.openxmlformats.org/markup-compatibility/2006" xmlns:mv="urn:schemas-microsoft-com:mac:vml" xmlns="" xmlns:p15="http://schemas.microsoft.com/office/powerpoint/2012/main">
         <p15:guide id="1" orient="horz">
           <p15:clr>
             <a:srgbClr val="A4A3A4"/>
@@ -1031,7 +1032,7 @@
           <a:p>
             <a:fld id="{792B1845-D904-C94D-9BA9-FEC36B05FE4E}" type="datetimeFigureOut">
               <a:rPr lang="en-US" smtClean="0"/>
-              <a:t>11/6/15</a:t>
+              <a:t>11/10/15</a:t>
             </a:fld>
             <a:endParaRPr lang="en-US"/>
           </a:p>
@@ -1325,7 +1326,7 @@
           <a:p>
             <a:fld id="{792B1845-D904-C94D-9BA9-FEC36B05FE4E}" type="datetimeFigureOut">
               <a:rPr lang="en-US" smtClean="0"/>
-              <a:t>11/6/15</a:t>
+              <a:t>11/10/15</a:t>
             </a:fld>
             <a:endParaRPr lang="en-US"/>
           </a:p>
@@ -1555,7 +1556,7 @@
           <a:p>
             <a:fld id="{792B1845-D904-C94D-9BA9-FEC36B05FE4E}" type="datetimeFigureOut">
               <a:rPr lang="en-US" smtClean="0"/>
-              <a:t>11/6/15</a:t>
+              <a:t>11/10/15</a:t>
             </a:fld>
             <a:endParaRPr lang="en-US"/>
           </a:p>
@@ -1795,7 +1796,7 @@
           <a:p>
             <a:fld id="{792B1845-D904-C94D-9BA9-FEC36B05FE4E}" type="datetimeFigureOut">
               <a:rPr lang="en-US" smtClean="0"/>
-              <a:t>11/6/15</a:t>
+              <a:t>11/10/15</a:t>
             </a:fld>
             <a:endParaRPr lang="en-US"/>
           </a:p>
@@ -2631,7 +2632,7 @@
           <a:p>
             <a:fld id="{792B1845-D904-C94D-9BA9-FEC36B05FE4E}" type="datetimeFigureOut">
               <a:rPr lang="en-US" smtClean="0"/>
-              <a:t>11/6/15</a:t>
+              <a:t>11/10/15</a:t>
             </a:fld>
             <a:endParaRPr lang="en-US"/>
           </a:p>
@@ -2911,7 +2912,7 @@
           <a:p>
             <a:fld id="{792B1845-D904-C94D-9BA9-FEC36B05FE4E}" type="datetimeFigureOut">
               <a:rPr lang="en-US" smtClean="0"/>
-              <a:t>11/6/15</a:t>
+              <a:t>11/10/15</a:t>
             </a:fld>
             <a:endParaRPr lang="en-US"/>
           </a:p>
@@ -3555,7 +3556,7 @@
           <a:p>
             <a:fld id="{792B1845-D904-C94D-9BA9-FEC36B05FE4E}" type="datetimeFigureOut">
               <a:rPr lang="en-US" smtClean="0"/>
-              <a:t>11/6/15</a:t>
+              <a:t>11/10/15</a:t>
             </a:fld>
             <a:endParaRPr lang="en-US"/>
           </a:p>
@@ -3912,7 +3913,7 @@
           <a:p>
             <a:fld id="{792B1845-D904-C94D-9BA9-FEC36B05FE4E}" type="datetimeFigureOut">
               <a:rPr lang="en-US" smtClean="0"/>
-              <a:t>11/6/15</a:t>
+              <a:t>11/10/15</a:t>
             </a:fld>
             <a:endParaRPr lang="en-US"/>
           </a:p>
@@ -4439,7 +4440,7 @@
           <a:p>
             <a:fld id="{792B1845-D904-C94D-9BA9-FEC36B05FE4E}" type="datetimeFigureOut">
               <a:rPr lang="en-US" smtClean="0"/>
-              <a:t>11/6/15</a:t>
+              <a:t>11/10/15</a:t>
             </a:fld>
             <a:endParaRPr lang="en-US"/>
           </a:p>
@@ -4662,7 +4663,7 @@
           <a:p>
             <a:fld id="{792B1845-D904-C94D-9BA9-FEC36B05FE4E}" type="datetimeFigureOut">
               <a:rPr lang="en-US" smtClean="0"/>
-              <a:t>11/6/15</a:t>
+              <a:t>11/10/15</a:t>
             </a:fld>
             <a:endParaRPr lang="en-US"/>
           </a:p>
@@ -4817,7 +4818,7 @@
           <a:p>
             <a:fld id="{792B1845-D904-C94D-9BA9-FEC36B05FE4E}" type="datetimeFigureOut">
               <a:rPr lang="en-US" smtClean="0"/>
-              <a:t>11/6/15</a:t>
+              <a:t>11/10/15</a:t>
             </a:fld>
             <a:endParaRPr lang="en-US"/>
           </a:p>
@@ -5154,7 +5155,7 @@
           <a:p>
             <a:fld id="{792B1845-D904-C94D-9BA9-FEC36B05FE4E}" type="datetimeFigureOut">
               <a:rPr lang="en-US" smtClean="0"/>
-              <a:t>11/6/15</a:t>
+              <a:t>11/10/15</a:t>
             </a:fld>
             <a:endParaRPr lang="en-US"/>
           </a:p>
@@ -5781,13 +5782,8 @@
           <a:p>
             <a:r>
               <a:rPr lang="en-US" dirty="0" smtClean="0"/>
-              <a:t>Nov. 9, </a:t>
-            </a:r>
-            <a:r>
-              <a:rPr lang="en-US" dirty="0" smtClean="0"/>
-              <a:t>2015</a:t>
-            </a:r>
-            <a:endParaRPr lang="en-US" dirty="0" smtClean="0"/>
+              <a:t>Nov. 9, 2015</a:t>
+            </a:r>
           </a:p>
           <a:p>
             <a:endParaRPr lang="en-US" dirty="0"/>
@@ -6005,10 +6001,18 @@
           <a:lstStyle/>
           <a:p>
             <a:r>
-              <a:rPr lang="en-US" dirty="0" smtClean="0"/>
+              <a:rPr lang="en-US" dirty="0" smtClean="0">
+                <a:solidFill>
+                  <a:srgbClr val="000000"/>
+                </a:solidFill>
+              </a:rPr>
               <a:t>Bad Loan Model</a:t>
             </a:r>
-            <a:endParaRPr lang="en-US" dirty="0"/>
+            <a:endParaRPr lang="en-US" dirty="0">
+              <a:solidFill>
+                <a:srgbClr val="000000"/>
+              </a:solidFill>
+            </a:endParaRPr>
           </a:p>
         </p:txBody>
       </p:sp>
@@ -6044,7 +6048,11 @@
               <a:buNone/>
             </a:pPr>
             <a:r>
-              <a:rPr lang="en-US" sz="2000" dirty="0" smtClean="0"/>
+              <a:rPr lang="en-US" sz="2000" dirty="0" smtClean="0">
+                <a:solidFill>
+                  <a:srgbClr val="000000"/>
+                </a:solidFill>
+              </a:rPr>
               <a:t>Algorithm: 		GBM</a:t>
             </a:r>
           </a:p>
@@ -6053,7 +6061,11 @@
               <a:buNone/>
             </a:pPr>
             <a:r>
-              <a:rPr lang="en-US" sz="2000" dirty="0" smtClean="0"/>
+              <a:rPr lang="en-US" sz="2000" dirty="0" smtClean="0">
+                <a:solidFill>
+                  <a:srgbClr val="000000"/>
+                </a:solidFill>
+              </a:rPr>
               <a:t>Model category:	Binary</a:t>
             </a:r>
           </a:p>
@@ -6062,7 +6074,11 @@
               <a:buNone/>
             </a:pPr>
             <a:r>
-              <a:rPr lang="en-US" sz="2000" dirty="0" smtClean="0"/>
+              <a:rPr lang="en-US" sz="2000" dirty="0" smtClean="0">
+                <a:solidFill>
+                  <a:srgbClr val="000000"/>
+                </a:solidFill>
+              </a:rPr>
               <a:t>				Classification</a:t>
             </a:r>
           </a:p>
@@ -6071,15 +6087,27 @@
               <a:buNone/>
             </a:pPr>
             <a:r>
-              <a:rPr lang="en-US" sz="2000" dirty="0" err="1"/>
+              <a:rPr lang="en-US" sz="2000" dirty="0" err="1">
+                <a:solidFill>
+                  <a:srgbClr val="000000"/>
+                </a:solidFill>
+              </a:rPr>
               <a:t>n</a:t>
             </a:r>
             <a:r>
-              <a:rPr lang="en-US" sz="2000" dirty="0" err="1" smtClean="0"/>
+              <a:rPr lang="en-US" sz="2000" dirty="0" err="1" smtClean="0">
+                <a:solidFill>
+                  <a:srgbClr val="000000"/>
+                </a:solidFill>
+              </a:rPr>
               <a:t>trees</a:t>
             </a:r>
             <a:r>
-              <a:rPr lang="en-US" sz="2000" dirty="0" smtClean="0"/>
+              <a:rPr lang="en-US" sz="2000" dirty="0" smtClean="0">
+                <a:solidFill>
+                  <a:srgbClr val="000000"/>
+                </a:solidFill>
+              </a:rPr>
               <a:t>:			100</a:t>
             </a:r>
           </a:p>
@@ -6088,11 +6116,19 @@
               <a:buNone/>
             </a:pPr>
             <a:r>
-              <a:rPr lang="en-US" sz="2000" dirty="0" err="1" smtClean="0"/>
+              <a:rPr lang="en-US" sz="2000" dirty="0" err="1" smtClean="0">
+                <a:solidFill>
+                  <a:srgbClr val="000000"/>
+                </a:solidFill>
+              </a:rPr>
               <a:t>max_depth</a:t>
             </a:r>
             <a:r>
-              <a:rPr lang="en-US" sz="2000" dirty="0" smtClean="0"/>
+              <a:rPr lang="en-US" sz="2000" dirty="0" smtClean="0">
+                <a:solidFill>
+                  <a:srgbClr val="000000"/>
+                </a:solidFill>
+              </a:rPr>
               <a:t>:		5</a:t>
             </a:r>
           </a:p>
@@ -6101,23 +6137,39 @@
               <a:buNone/>
             </a:pPr>
             <a:r>
-              <a:rPr lang="en-US" sz="2000" dirty="0" err="1" smtClean="0"/>
+              <a:rPr lang="en-US" sz="2000" dirty="0" err="1" smtClean="0">
+                <a:solidFill>
+                  <a:srgbClr val="000000"/>
+                </a:solidFill>
+              </a:rPr>
               <a:t>learn_rate</a:t>
             </a:r>
             <a:r>
-              <a:rPr lang="en-US" sz="2000" dirty="0" smtClean="0"/>
+              <a:rPr lang="en-US" sz="2000" dirty="0" smtClean="0">
+                <a:solidFill>
+                  <a:srgbClr val="000000"/>
+                </a:solidFill>
+              </a:rPr>
               <a:t>:		0.05</a:t>
             </a:r>
           </a:p>
           <a:p>
-            <a:endParaRPr lang="en-US" sz="2000" dirty="0" smtClean="0"/>
+            <a:endParaRPr lang="en-US" sz="2000" dirty="0" smtClean="0">
+              <a:solidFill>
+                <a:srgbClr val="000000"/>
+              </a:solidFill>
+            </a:endParaRPr>
           </a:p>
           <a:p>
             <a:pPr marL="0" indent="0">
               <a:buNone/>
             </a:pPr>
             <a:r>
-              <a:rPr lang="en-US" sz="2000" dirty="0" smtClean="0"/>
+              <a:rPr lang="en-US" sz="2000" dirty="0" smtClean="0">
+                <a:solidFill>
+                  <a:srgbClr val="000000"/>
+                </a:solidFill>
+              </a:rPr>
               <a:t>AUC on valid:	.685</a:t>
             </a:r>
           </a:p>
@@ -6126,10 +6178,18 @@
               <a:buNone/>
             </a:pPr>
             <a:r>
-              <a:rPr lang="en-US" sz="2000" dirty="0" smtClean="0"/>
+              <a:rPr lang="en-US" sz="2000" dirty="0" smtClean="0">
+                <a:solidFill>
+                  <a:srgbClr val="000000"/>
+                </a:solidFill>
+              </a:rPr>
               <a:t>max F1:			0.202</a:t>
             </a:r>
-            <a:endParaRPr lang="en-US" sz="2000" dirty="0"/>
+            <a:endParaRPr lang="en-US" sz="2000" dirty="0">
+              <a:solidFill>
+                <a:srgbClr val="000000"/>
+              </a:solidFill>
+            </a:endParaRPr>
           </a:p>
         </p:txBody>
       </p:sp>
@@ -6154,10 +6214,18 @@
           <a:lstStyle/>
           <a:p>
             <a:r>
-              <a:rPr lang="en-US" dirty="0" smtClean="0"/>
+              <a:rPr lang="en-US" dirty="0" smtClean="0">
+                <a:solidFill>
+                  <a:srgbClr val="000000"/>
+                </a:solidFill>
+              </a:rPr>
               <a:t>Interest Rate Model</a:t>
             </a:r>
-            <a:endParaRPr lang="en-US" dirty="0"/>
+            <a:endParaRPr lang="en-US" dirty="0">
+              <a:solidFill>
+                <a:srgbClr val="000000"/>
+              </a:solidFill>
+            </a:endParaRPr>
           </a:p>
         </p:txBody>
       </p:sp>
@@ -6191,7 +6259,11 @@
               <a:buNone/>
             </a:pPr>
             <a:r>
-              <a:rPr lang="en-US" sz="2000" dirty="0" smtClean="0"/>
+              <a:rPr lang="en-US" sz="2000" dirty="0" smtClean="0">
+                <a:solidFill>
+                  <a:srgbClr val="000000"/>
+                </a:solidFill>
+              </a:rPr>
               <a:t>Algorithm:		GBM</a:t>
             </a:r>
           </a:p>
@@ -6200,7 +6272,11 @@
               <a:buNone/>
             </a:pPr>
             <a:r>
-              <a:rPr lang="en-US" sz="2000" dirty="0" smtClean="0"/>
+              <a:rPr lang="en-US" sz="2000" dirty="0" smtClean="0">
+                <a:solidFill>
+                  <a:srgbClr val="000000"/>
+                </a:solidFill>
+              </a:rPr>
               <a:t>Model category:	Regression</a:t>
             </a:r>
           </a:p>
@@ -6208,22 +6284,38 @@
             <a:pPr marL="0" indent="0">
               <a:buNone/>
             </a:pPr>
-            <a:endParaRPr lang="en-US" sz="2000" dirty="0" smtClean="0"/>
+            <a:endParaRPr lang="en-US" sz="2000" dirty="0" smtClean="0">
+              <a:solidFill>
+                <a:srgbClr val="000000"/>
+              </a:solidFill>
+            </a:endParaRPr>
           </a:p>
           <a:p>
             <a:pPr marL="0" indent="0">
               <a:buNone/>
             </a:pPr>
             <a:r>
-              <a:rPr lang="en-US" sz="2000" dirty="0" err="1"/>
+              <a:rPr lang="en-US" sz="2000" dirty="0" err="1">
+                <a:solidFill>
+                  <a:srgbClr val="000000"/>
+                </a:solidFill>
+              </a:rPr>
               <a:t>n</a:t>
             </a:r>
             <a:r>
-              <a:rPr lang="en-US" sz="2000" dirty="0" err="1" smtClean="0"/>
+              <a:rPr lang="en-US" sz="2000" dirty="0" err="1" smtClean="0">
+                <a:solidFill>
+                  <a:srgbClr val="000000"/>
+                </a:solidFill>
+              </a:rPr>
               <a:t>trees</a:t>
             </a:r>
             <a:r>
-              <a:rPr lang="en-US" sz="2000" dirty="0" smtClean="0"/>
+              <a:rPr lang="en-US" sz="2000" dirty="0" smtClean="0">
+                <a:solidFill>
+                  <a:srgbClr val="000000"/>
+                </a:solidFill>
+              </a:rPr>
               <a:t>:			100</a:t>
             </a:r>
           </a:p>
@@ -6232,11 +6324,19 @@
               <a:buNone/>
             </a:pPr>
             <a:r>
-              <a:rPr lang="en-US" sz="2000" dirty="0" err="1" smtClean="0"/>
+              <a:rPr lang="en-US" sz="2000" dirty="0" err="1" smtClean="0">
+                <a:solidFill>
+                  <a:srgbClr val="000000"/>
+                </a:solidFill>
+              </a:rPr>
               <a:t>max_depth</a:t>
             </a:r>
             <a:r>
-              <a:rPr lang="en-US" sz="2000" dirty="0" smtClean="0"/>
+              <a:rPr lang="en-US" sz="2000" dirty="0" smtClean="0">
+                <a:solidFill>
+                  <a:srgbClr val="000000"/>
+                </a:solidFill>
+              </a:rPr>
               <a:t>:		5</a:t>
             </a:r>
           </a:p>
@@ -6245,15 +6345,27 @@
               <a:buNone/>
             </a:pPr>
             <a:r>
-              <a:rPr lang="en-US" sz="2000" dirty="0" err="1"/>
+              <a:rPr lang="en-US" sz="2000" dirty="0" err="1">
+                <a:solidFill>
+                  <a:srgbClr val="000000"/>
+                </a:solidFill>
+              </a:rPr>
               <a:t>l</a:t>
             </a:r>
             <a:r>
-              <a:rPr lang="en-US" sz="2000" dirty="0" err="1" smtClean="0"/>
+              <a:rPr lang="en-US" sz="2000" dirty="0" err="1" smtClean="0">
+                <a:solidFill>
+                  <a:srgbClr val="000000"/>
+                </a:solidFill>
+              </a:rPr>
               <a:t>earn_rate</a:t>
             </a:r>
             <a:r>
-              <a:rPr lang="en-US" sz="2000" dirty="0" smtClean="0"/>
+              <a:rPr lang="en-US" sz="2000" dirty="0" smtClean="0">
+                <a:solidFill>
+                  <a:srgbClr val="000000"/>
+                </a:solidFill>
+              </a:rPr>
               <a:t>:		0.05</a:t>
             </a:r>
           </a:p>
@@ -6261,27 +6373,47 @@
             <a:pPr marL="0" indent="0">
               <a:buNone/>
             </a:pPr>
-            <a:endParaRPr lang="en-US" sz="2000" dirty="0" smtClean="0"/>
+            <a:endParaRPr lang="en-US" sz="2000" dirty="0" smtClean="0">
+              <a:solidFill>
+                <a:srgbClr val="000000"/>
+              </a:solidFill>
+            </a:endParaRPr>
           </a:p>
           <a:p>
             <a:pPr marL="0" indent="0">
               <a:buNone/>
             </a:pPr>
             <a:r>
-              <a:rPr lang="en-US" sz="2000" dirty="0" smtClean="0"/>
+              <a:rPr lang="en-US" sz="2000" dirty="0" smtClean="0">
+                <a:solidFill>
+                  <a:srgbClr val="000000"/>
+                </a:solidFill>
+              </a:rPr>
               <a:t>MSE:			11.1</a:t>
             </a:r>
-            <a:endParaRPr lang="en-US" sz="2000" dirty="0"/>
+            <a:endParaRPr lang="en-US" sz="2000" dirty="0">
+              <a:solidFill>
+                <a:srgbClr val="000000"/>
+              </a:solidFill>
+            </a:endParaRPr>
           </a:p>
           <a:p>
             <a:pPr marL="0" indent="0">
               <a:buNone/>
             </a:pPr>
             <a:r>
-              <a:rPr lang="en-US" sz="2000" dirty="0" smtClean="0"/>
+              <a:rPr lang="en-US" sz="2000" dirty="0" smtClean="0">
+                <a:solidFill>
+                  <a:srgbClr val="000000"/>
+                </a:solidFill>
+              </a:rPr>
               <a:t>R2:				0.424</a:t>
             </a:r>
-            <a:endParaRPr lang="en-US" sz="2000" dirty="0"/>
+            <a:endParaRPr lang="en-US" sz="2000" dirty="0">
+              <a:solidFill>
+                <a:srgbClr val="000000"/>
+              </a:solidFill>
+            </a:endParaRPr>
           </a:p>
           <a:p>
             <a:endParaRPr lang="en-US" dirty="0"/>
@@ -6497,11 +6629,7 @@
           <a:p>
             <a:r>
               <a:rPr lang="en-US" dirty="0" smtClean="0"/>
-              <a:t>WHAT YOU </a:t>
-            </a:r>
-            <a:r>
-              <a:rPr lang="en-US" dirty="0" smtClean="0"/>
-              <a:t>NEED FOR HANDS-ON</a:t>
+              <a:t>WHAT YOU NEED FOR HANDS-ON</a:t>
             </a:r>
             <a:endParaRPr lang="en-US" dirty="0"/>
           </a:p>
@@ -6531,17 +6659,8 @@
           <a:p>
             <a:r>
               <a:rPr lang="en-US" dirty="0" smtClean="0"/>
-              <a:t>R </a:t>
-            </a:r>
-            <a:r>
-              <a:rPr lang="en-US" dirty="0" smtClean="0"/>
-              <a:t>and the H2O R </a:t>
-            </a:r>
-            <a:r>
-              <a:rPr lang="en-US" dirty="0" smtClean="0"/>
-              <a:t>package (from USB)</a:t>
-            </a:r>
-            <a:endParaRPr lang="en-US" dirty="0" smtClean="0"/>
+              <a:t>R and the H2O R package (from USB)</a:t>
+            </a:r>
           </a:p>
           <a:p>
             <a:r>
@@ -6554,13 +6673,8 @@
             </a:r>
             <a:r>
               <a:rPr lang="en-US" dirty="0" smtClean="0"/>
-              <a:t> (from </a:t>
-            </a:r>
-            <a:r>
-              <a:rPr lang="en-US" dirty="0" smtClean="0"/>
-              <a:t>USB)</a:t>
-            </a:r>
-            <a:endParaRPr lang="en-US" dirty="0" smtClean="0"/>
+              <a:t> (from USB)</a:t>
+            </a:r>
           </a:p>
           <a:p>
             <a:r>
@@ -6573,13 +6687,8 @@
             </a:r>
             <a:r>
               <a:rPr lang="en-US" dirty="0" smtClean="0"/>
-              <a:t>rom </a:t>
-            </a:r>
-            <a:r>
-              <a:rPr lang="en-US" dirty="0" smtClean="0"/>
-              <a:t>USB)</a:t>
-            </a:r>
-            <a:endParaRPr lang="en-US" dirty="0" smtClean="0"/>
+              <a:t>rom USB)</a:t>
+            </a:r>
           </a:p>
           <a:p>
             <a:pPr lvl="1"/>
@@ -6853,19 +6962,7 @@
             </a:pPr>
             <a:r>
               <a:rPr lang="en-US" dirty="0" smtClean="0"/>
-              <a:t>C</a:t>
-            </a:r>
-            <a:r>
-              <a:rPr lang="en-US" dirty="0" smtClean="0"/>
-              <a:t>:&gt; cd path\to</a:t>
-            </a:r>
-            <a:r>
-              <a:rPr lang="en-US" dirty="0" smtClean="0"/>
-              <a:t>\H2OWorld2015\USB\</a:t>
-            </a:r>
-            <a:r>
-              <a:rPr lang="en-US" dirty="0" smtClean="0"/>
-              <a:t>image</a:t>
+              <a:t>C:&gt; cd path\to\H2OWorld2015\USB\image</a:t>
             </a:r>
           </a:p>
           <a:p>
@@ -6887,15 +6984,7 @@
             </a:pPr>
             <a:r>
               <a:rPr lang="en-US" dirty="0" smtClean="0"/>
-              <a:t>C:&gt; </a:t>
-            </a:r>
-            <a:r>
-              <a:rPr lang="en-US" dirty="0" smtClean="0"/>
-              <a:t>..\</a:t>
-            </a:r>
-            <a:r>
-              <a:rPr lang="en-US" dirty="0" smtClean="0"/>
-              <a:t>gradle</a:t>
+              <a:t>C:&gt; ..\gradle</a:t>
             </a:r>
             <a:r>
               <a:rPr lang="en-US" dirty="0"/>
@@ -7062,12 +7151,14 @@
         </p:nvSpPr>
         <p:spPr/>
         <p:txBody>
-          <a:bodyPr/>
+          <a:bodyPr>
+            <a:normAutofit/>
+          </a:bodyPr>
           <a:lstStyle/>
           <a:p>
             <a:r>
               <a:rPr lang="en-US" dirty="0" smtClean="0"/>
-              <a:t>KEY FILES</a:t>
+              <a:t>COMMON HANDS-ON ERRORS</a:t>
             </a:r>
             <a:endParaRPr lang="en-US" dirty="0"/>
           </a:p>
@@ -7075,7 +7166,7 @@
       </p:sp>
       <p:sp>
         <p:nvSpPr>
-          <p:cNvPr id="3" name="Content Placeholder 2"/>
+          <p:cNvPr id="9" name="Content Placeholder 8"/>
           <p:cNvSpPr>
             <a:spLocks noGrp="1"/>
           </p:cNvSpPr>
@@ -7083,233 +7174,104 @@
             <p:ph idx="1"/>
           </p:nvPr>
         </p:nvSpPr>
-        <p:spPr>
-          <a:xfrm>
-            <a:off x="457200" y="1231900"/>
-            <a:ext cx="8229600" cy="5334000"/>
-          </a:xfrm>
-        </p:spPr>
+        <p:spPr/>
         <p:txBody>
           <a:bodyPr>
-            <a:normAutofit fontScale="77500" lnSpcReduction="20000"/>
+            <a:normAutofit fontScale="92500" lnSpcReduction="20000"/>
           </a:bodyPr>
           <a:lstStyle/>
           <a:p>
             <a:r>
+              <a:rPr lang="en-US" dirty="0" smtClean="0"/>
+              <a:t>Common R errors</a:t>
+            </a:r>
+          </a:p>
+          <a:p>
+            <a:pPr lvl="1"/>
+            <a:r>
+              <a:rPr lang="en-US" dirty="0" smtClean="0"/>
+              <a:t>R not on PATH</a:t>
+            </a:r>
+          </a:p>
+          <a:p>
+            <a:pPr lvl="2"/>
+            <a:r>
+              <a:rPr lang="en-US" dirty="0" err="1" smtClean="0"/>
+              <a:t>Gradle</a:t>
+            </a:r>
+            <a:r>
               <a:rPr lang="en-US" dirty="0"/>
-              <a:t>Offline</a:t>
+              <a:t> </a:t>
+            </a:r>
+            <a:r>
+              <a:rPr lang="en-US" dirty="0" smtClean="0"/>
+              <a:t>needs to invoke R</a:t>
             </a:r>
           </a:p>
           <a:p>
             <a:pPr lvl="1"/>
             <a:r>
-              <a:rPr lang="en-US" b="1" dirty="0" err="1"/>
-              <a:t>build.gradle</a:t>
-            </a:r>
-            <a:endParaRPr lang="en-US" b="1" dirty="0"/>
+              <a:rPr lang="en-US" dirty="0" smtClean="0"/>
+              <a:t>Another H2O is already running</a:t>
+            </a:r>
+          </a:p>
+          <a:p>
+            <a:pPr lvl="2"/>
+            <a:r>
+              <a:rPr lang="en-US" dirty="0" smtClean="0"/>
+              <a:t>the R script can’t find the data in h2o.importFile()</a:t>
+            </a:r>
+          </a:p>
+          <a:p>
+            <a:pPr marL="914400" lvl="2" indent="0">
+              <a:buNone/>
+            </a:pPr>
+            <a:endParaRPr lang="en-US" dirty="0" smtClean="0"/>
+          </a:p>
+          <a:p>
+            <a:r>
+              <a:rPr lang="en-US" dirty="0" smtClean="0"/>
+              <a:t>Common Java errors</a:t>
+            </a:r>
           </a:p>
           <a:p>
             <a:pPr lvl="1"/>
             <a:r>
-              <a:rPr lang="en-US" b="1" dirty="0" smtClean="0"/>
-              <a:t>data</a:t>
-            </a:r>
-            <a:r>
-              <a:rPr lang="en-US" b="1" dirty="0"/>
-              <a:t>/</a:t>
-            </a:r>
-            <a:r>
-              <a:rPr lang="en-US" b="1" dirty="0" err="1"/>
-              <a:t>loan.csv</a:t>
-            </a:r>
-            <a:endParaRPr lang="en-US" b="1" dirty="0"/>
+              <a:rPr lang="en-US" dirty="0" smtClean="0"/>
+              <a:t>Java not installed at all</a:t>
+            </a:r>
+          </a:p>
+          <a:p>
+            <a:pPr lvl="2"/>
+            <a:r>
+              <a:rPr lang="en-US" dirty="0" smtClean="0"/>
+              <a:t>Also, must install a JDK (Java Development Kit) so that the Java compiler is available (JRE is not sufficient)</a:t>
+            </a:r>
           </a:p>
           <a:p>
             <a:pPr lvl="1"/>
             <a:r>
-              <a:rPr lang="en-US" b="1" dirty="0" err="1"/>
-              <a:t>script.R</a:t>
-            </a:r>
-            <a:endParaRPr lang="en-US" b="1" dirty="0"/>
-          </a:p>
-          <a:p>
-            <a:endParaRPr lang="en-US" dirty="0" smtClean="0"/>
-          </a:p>
-          <a:p>
-            <a:r>
               <a:rPr lang="en-US" dirty="0" smtClean="0"/>
-              <a:t>Front-end</a:t>
-            </a:r>
-          </a:p>
-          <a:p>
-            <a:pPr lvl="1"/>
-            <a:r>
-              <a:rPr lang="en-US" b="1" dirty="0" err="1"/>
-              <a:t>s</a:t>
-            </a:r>
-            <a:r>
-              <a:rPr lang="en-US" b="1" dirty="0" err="1" smtClean="0"/>
-              <a:t>rc</a:t>
-            </a:r>
-            <a:r>
-              <a:rPr lang="en-US" b="1" dirty="0" smtClean="0"/>
-              <a:t>/main/</a:t>
-            </a:r>
-            <a:r>
-              <a:rPr lang="en-US" b="1" dirty="0" err="1" smtClean="0"/>
-              <a:t>webapp</a:t>
-            </a:r>
-            <a:r>
-              <a:rPr lang="en-US" b="1" dirty="0" smtClean="0"/>
-              <a:t>/</a:t>
-            </a:r>
-            <a:r>
-              <a:rPr lang="en-US" b="1" dirty="0" err="1" smtClean="0"/>
-              <a:t>index.html</a:t>
-            </a:r>
-            <a:endParaRPr lang="en-US" b="1" dirty="0" smtClean="0"/>
-          </a:p>
-          <a:p>
-            <a:pPr lvl="1"/>
-            <a:r>
-              <a:rPr lang="en-US" b="1" dirty="0" err="1"/>
-              <a:t>s</a:t>
-            </a:r>
-            <a:r>
-              <a:rPr lang="en-US" b="1" dirty="0" err="1" smtClean="0"/>
-              <a:t>rc</a:t>
-            </a:r>
-            <a:r>
-              <a:rPr lang="en-US" b="1" dirty="0" smtClean="0"/>
-              <a:t>/main/</a:t>
-            </a:r>
-            <a:r>
-              <a:rPr lang="en-US" b="1" dirty="0" err="1" smtClean="0"/>
-              <a:t>webapp</a:t>
-            </a:r>
-            <a:r>
-              <a:rPr lang="en-US" b="1" dirty="0" smtClean="0"/>
-              <a:t>/</a:t>
-            </a:r>
-            <a:r>
-              <a:rPr lang="en-US" b="1" dirty="0" err="1" smtClean="0"/>
-              <a:t>app.js</a:t>
-            </a:r>
-            <a:endParaRPr lang="en-US" b="1" dirty="0" smtClean="0"/>
-          </a:p>
-          <a:p>
-            <a:pPr lvl="1"/>
-            <a:endParaRPr lang="en-US" dirty="0" smtClean="0"/>
-          </a:p>
-          <a:p>
+              <a:t>Not connected to the internet</a:t>
+            </a:r>
+          </a:p>
+          <a:p>
+            <a:pPr lvl="2"/>
+            <a:r>
+              <a:rPr lang="en-US" dirty="0" err="1" smtClean="0"/>
+              <a:t>Gradle</a:t>
+            </a:r>
             <a:r>
               <a:rPr lang="en-US" dirty="0" smtClean="0"/>
-              <a:t>Back-end</a:t>
-            </a:r>
-          </a:p>
-          <a:p>
-            <a:pPr lvl="1"/>
-            <a:r>
-              <a:rPr lang="en-US" b="1" dirty="0" err="1"/>
-              <a:t>src</a:t>
-            </a:r>
-            <a:r>
-              <a:rPr lang="en-US" b="1" dirty="0"/>
-              <a:t>/main/java/org/</a:t>
-            </a:r>
-            <a:r>
-              <a:rPr lang="en-US" b="1" dirty="0" err="1"/>
-              <a:t>gradle</a:t>
-            </a:r>
-            <a:r>
-              <a:rPr lang="en-US" b="1" dirty="0"/>
-              <a:t>/</a:t>
-            </a:r>
-            <a:r>
-              <a:rPr lang="en-US" b="1" dirty="0" err="1"/>
-              <a:t>PredictServlet.java</a:t>
-            </a:r>
-            <a:endParaRPr lang="en-US" b="1" dirty="0"/>
-          </a:p>
-          <a:p>
-            <a:pPr lvl="1"/>
-            <a:r>
-              <a:rPr lang="en-US" i="1" dirty="0" smtClean="0"/>
-              <a:t>lib</a:t>
-            </a:r>
-            <a:r>
-              <a:rPr lang="en-US" i="1" dirty="0"/>
-              <a:t>/h2o-</a:t>
-            </a:r>
-            <a:r>
-              <a:rPr lang="en-US" i="1" dirty="0" smtClean="0"/>
-              <a:t>genmodel.jar (downloaded)</a:t>
-            </a:r>
-          </a:p>
-          <a:p>
-            <a:pPr lvl="1"/>
-            <a:r>
-              <a:rPr lang="en-US" i="1" dirty="0" err="1" smtClean="0"/>
-              <a:t>src</a:t>
-            </a:r>
-            <a:r>
-              <a:rPr lang="en-US" i="1" dirty="0"/>
-              <a:t>/main/java/org/</a:t>
-            </a:r>
-            <a:r>
-              <a:rPr lang="en-US" i="1" dirty="0" err="1"/>
-              <a:t>gradle</a:t>
-            </a:r>
-            <a:r>
-              <a:rPr lang="en-US" i="1" dirty="0"/>
-              <a:t>/</a:t>
-            </a:r>
-            <a:r>
-              <a:rPr lang="en-US" i="1" dirty="0" err="1" smtClean="0"/>
-              <a:t>BadLoanModel.java</a:t>
-            </a:r>
-            <a:r>
-              <a:rPr lang="en-US" i="1" dirty="0" smtClean="0"/>
-              <a:t> (generated)</a:t>
-            </a:r>
-          </a:p>
-          <a:p>
-            <a:pPr lvl="1"/>
-            <a:r>
-              <a:rPr lang="en-US" i="1" dirty="0" err="1"/>
-              <a:t>src</a:t>
-            </a:r>
-            <a:r>
-              <a:rPr lang="en-US" i="1" dirty="0"/>
-              <a:t>/main/java/org/</a:t>
-            </a:r>
-            <a:r>
-              <a:rPr lang="en-US" i="1" dirty="0" err="1"/>
-              <a:t>gradle</a:t>
-            </a:r>
-            <a:r>
-              <a:rPr lang="en-US" i="1" dirty="0"/>
-              <a:t>/</a:t>
-            </a:r>
-            <a:r>
-              <a:rPr lang="en-US" i="1" dirty="0" err="1" smtClean="0"/>
-              <a:t>InterestRateModel.java</a:t>
-            </a:r>
-            <a:r>
-              <a:rPr lang="en-US" i="1" dirty="0" smtClean="0"/>
-              <a:t> (generated)</a:t>
-            </a:r>
-          </a:p>
-          <a:p>
-            <a:pPr lvl="1"/>
-            <a:endParaRPr lang="en-US" dirty="0" smtClean="0"/>
+              <a:t> needs to fetch some dependencies from the internet</a:t>
+            </a:r>
           </a:p>
         </p:txBody>
       </p:sp>
     </p:spTree>
     <p:extLst>
       <p:ext uri="{BB962C8B-B14F-4D97-AF65-F5344CB8AC3E}">
-        <p14:creationId xmlns:p14="http://schemas.microsoft.com/office/powerpoint/2010/main" val="1478725367"/>
+        <p14:creationId xmlns:p14="http://schemas.microsoft.com/office/powerpoint/2010/main" val="1150573929"/>
       </p:ext>
     </p:extLst>
   </p:cSld>
@@ -7360,7 +7322,7 @@
           <a:p>
             <a:r>
               <a:rPr lang="en-US" dirty="0" smtClean="0"/>
-              <a:t>POST-DEMO POINTERS</a:t>
+              <a:t>KEY FILES</a:t>
             </a:r>
             <a:endParaRPr lang="en-US" dirty="0"/>
           </a:p>
@@ -7376,55 +7338,233 @@
             <p:ph idx="1"/>
           </p:nvPr>
         </p:nvSpPr>
-        <p:spPr/>
-        <p:txBody>
-          <a:bodyPr/>
-          <a:lstStyle/>
+        <p:spPr>
+          <a:xfrm>
+            <a:off x="457200" y="1231900"/>
+            <a:ext cx="8229600" cy="5334000"/>
+          </a:xfrm>
+        </p:spPr>
+        <p:txBody>
+          <a:bodyPr>
+            <a:normAutofit fontScale="77500" lnSpcReduction="20000"/>
+          </a:bodyPr>
+          <a:lstStyle/>
+          <a:p>
+            <a:r>
+              <a:rPr lang="en-US" dirty="0"/>
+              <a:t>Offline</a:t>
+            </a:r>
+          </a:p>
+          <a:p>
+            <a:pPr lvl="1"/>
+            <a:r>
+              <a:rPr lang="en-US" b="1" dirty="0" err="1"/>
+              <a:t>build.gradle</a:t>
+            </a:r>
+            <a:endParaRPr lang="en-US" b="1" dirty="0"/>
+          </a:p>
+          <a:p>
+            <a:pPr lvl="1"/>
+            <a:r>
+              <a:rPr lang="en-US" b="1" dirty="0" smtClean="0"/>
+              <a:t>data</a:t>
+            </a:r>
+            <a:r>
+              <a:rPr lang="en-US" b="1" dirty="0"/>
+              <a:t>/</a:t>
+            </a:r>
+            <a:r>
+              <a:rPr lang="en-US" b="1" dirty="0" err="1"/>
+              <a:t>loan.csv</a:t>
+            </a:r>
+            <a:endParaRPr lang="en-US" b="1" dirty="0"/>
+          </a:p>
+          <a:p>
+            <a:pPr lvl="1"/>
+            <a:r>
+              <a:rPr lang="en-US" b="1" dirty="0" err="1"/>
+              <a:t>script.R</a:t>
+            </a:r>
+            <a:endParaRPr lang="en-US" b="1" dirty="0"/>
+          </a:p>
+          <a:p>
+            <a:endParaRPr lang="en-US" dirty="0" smtClean="0"/>
+          </a:p>
           <a:p>
             <a:r>
               <a:rPr lang="en-US" dirty="0" smtClean="0"/>
-              <a:t>POJO </a:t>
-            </a:r>
-            <a:r>
-              <a:rPr lang="en-US" dirty="0" err="1" smtClean="0"/>
-              <a:t>Javadoc</a:t>
-            </a:r>
+              <a:t>Front-end</a:t>
+            </a:r>
+          </a:p>
+          <a:p>
+            <a:pPr lvl="1"/>
+            <a:r>
+              <a:rPr lang="en-US" b="1" dirty="0" err="1"/>
+              <a:t>s</a:t>
+            </a:r>
+            <a:r>
+              <a:rPr lang="en-US" b="1" dirty="0" err="1" smtClean="0"/>
+              <a:t>rc</a:t>
+            </a:r>
+            <a:r>
+              <a:rPr lang="en-US" b="1" dirty="0" smtClean="0"/>
+              <a:t>/main/</a:t>
+            </a:r>
+            <a:r>
+              <a:rPr lang="en-US" b="1" dirty="0" err="1" smtClean="0"/>
+              <a:t>webapp</a:t>
+            </a:r>
+            <a:r>
+              <a:rPr lang="en-US" b="1" dirty="0" smtClean="0"/>
+              <a:t>/</a:t>
+            </a:r>
+            <a:r>
+              <a:rPr lang="en-US" b="1" dirty="0" err="1" smtClean="0"/>
+              <a:t>index.html</a:t>
+            </a:r>
+            <a:endParaRPr lang="en-US" b="1" dirty="0" smtClean="0"/>
+          </a:p>
+          <a:p>
+            <a:pPr lvl="1"/>
+            <a:r>
+              <a:rPr lang="en-US" b="1" dirty="0" err="1"/>
+              <a:t>s</a:t>
+            </a:r>
+            <a:r>
+              <a:rPr lang="en-US" b="1" dirty="0" err="1" smtClean="0"/>
+              <a:t>rc</a:t>
+            </a:r>
+            <a:r>
+              <a:rPr lang="en-US" b="1" dirty="0" smtClean="0"/>
+              <a:t>/main/</a:t>
+            </a:r>
+            <a:r>
+              <a:rPr lang="en-US" b="1" dirty="0" err="1" smtClean="0"/>
+              <a:t>webapp</a:t>
+            </a:r>
+            <a:r>
+              <a:rPr lang="en-US" b="1" dirty="0" smtClean="0"/>
+              <a:t>/</a:t>
+            </a:r>
+            <a:r>
+              <a:rPr lang="en-US" b="1" dirty="0" err="1" smtClean="0"/>
+              <a:t>app.js</a:t>
+            </a:r>
+            <a:endParaRPr lang="en-US" b="1" dirty="0" smtClean="0"/>
+          </a:p>
+          <a:p>
+            <a:pPr lvl="1"/>
             <a:endParaRPr lang="en-US" dirty="0" smtClean="0"/>
           </a:p>
           <a:p>
+            <a:r>
+              <a:rPr lang="en-US" dirty="0" smtClean="0"/>
+              <a:t>Back-end</a:t>
+            </a:r>
+          </a:p>
+          <a:p>
             <a:pPr lvl="1"/>
             <a:r>
-              <a:rPr lang="en-US" dirty="0"/>
-              <a:t>http://h2o-release.s3.amazonaws.com/h2o/</a:t>
-            </a:r>
-            <a:r>
-              <a:rPr lang="en-US" dirty="0" err="1"/>
-              <a:t>rel-tibshirani</a:t>
-            </a:r>
-            <a:r>
-              <a:rPr lang="en-US" dirty="0"/>
-              <a:t>/2/docs-website/h2o-genmodel/</a:t>
-            </a:r>
-            <a:r>
-              <a:rPr lang="en-US" dirty="0" err="1"/>
-              <a:t>javadoc</a:t>
-            </a:r>
-            <a:r>
-              <a:rPr lang="en-US" dirty="0"/>
+              <a:rPr lang="en-US" b="1" dirty="0" err="1"/>
+              <a:t>src</a:t>
+            </a:r>
+            <a:r>
+              <a:rPr lang="en-US" b="1" dirty="0"/>
+              <a:t>/main/java/org/</a:t>
+            </a:r>
+            <a:r>
+              <a:rPr lang="en-US" b="1" dirty="0" err="1"/>
+              <a:t>gradle</a:t>
+            </a:r>
+            <a:r>
+              <a:rPr lang="en-US" b="1" dirty="0"/>
               <a:t>/</a:t>
             </a:r>
             <a:r>
-              <a:rPr lang="en-US" dirty="0" err="1"/>
-              <a:t>index.html</a:t>
-            </a:r>
-            <a:endParaRPr lang="en-US" dirty="0"/>
+              <a:rPr lang="en-US" b="1" dirty="0" err="1"/>
+              <a:t>PredictServlet.java</a:t>
+            </a:r>
+            <a:endParaRPr lang="en-US" b="1" dirty="0"/>
+          </a:p>
+          <a:p>
+            <a:pPr lvl="1"/>
+            <a:r>
+              <a:rPr lang="en-US" i="1" dirty="0" smtClean="0"/>
+              <a:t>lib</a:t>
+            </a:r>
+            <a:r>
+              <a:rPr lang="en-US" i="1" dirty="0"/>
+              <a:t>/h2o-</a:t>
+            </a:r>
+            <a:r>
+              <a:rPr lang="en-US" i="1" dirty="0" smtClean="0"/>
+              <a:t>genmodel.jar (downloaded)</a:t>
+            </a:r>
+          </a:p>
+          <a:p>
+            <a:pPr lvl="1"/>
+            <a:r>
+              <a:rPr lang="en-US" i="1" dirty="0" err="1" smtClean="0"/>
+              <a:t>src</a:t>
+            </a:r>
+            <a:r>
+              <a:rPr lang="en-US" i="1" dirty="0"/>
+              <a:t>/main/java/org/</a:t>
+            </a:r>
+            <a:r>
+              <a:rPr lang="en-US" i="1" dirty="0" err="1"/>
+              <a:t>gradle</a:t>
+            </a:r>
+            <a:r>
+              <a:rPr lang="en-US" i="1" dirty="0"/>
+              <a:t>/</a:t>
+            </a:r>
+            <a:r>
+              <a:rPr lang="en-US" i="1" dirty="0" err="1" smtClean="0"/>
+              <a:t>BadLoanModel.java</a:t>
+            </a:r>
+            <a:r>
+              <a:rPr lang="en-US" i="1" dirty="0" smtClean="0"/>
+              <a:t> (generated)</a:t>
+            </a:r>
+          </a:p>
+          <a:p>
+            <a:pPr lvl="1"/>
+            <a:r>
+              <a:rPr lang="en-US" i="1" dirty="0" err="1"/>
+              <a:t>src</a:t>
+            </a:r>
+            <a:r>
+              <a:rPr lang="en-US" i="1" dirty="0"/>
+              <a:t>/main/java/org/</a:t>
+            </a:r>
+            <a:r>
+              <a:rPr lang="en-US" i="1" dirty="0" err="1"/>
+              <a:t>gradle</a:t>
+            </a:r>
+            <a:r>
+              <a:rPr lang="en-US" i="1" dirty="0"/>
+              <a:t>/</a:t>
+            </a:r>
+            <a:r>
+              <a:rPr lang="en-US" i="1" dirty="0" err="1" smtClean="0"/>
+              <a:t>InterestRateModel.java</a:t>
+            </a:r>
+            <a:r>
+              <a:rPr lang="en-US" i="1" dirty="0" smtClean="0"/>
+              <a:t> (generated)</a:t>
+            </a:r>
+          </a:p>
+          <a:p>
+            <a:pPr lvl="1"/>
+            <a:endParaRPr lang="en-US" dirty="0" smtClean="0"/>
           </a:p>
         </p:txBody>
       </p:sp>
     </p:spTree>
     <p:extLst>
       <p:ext uri="{BB962C8B-B14F-4D97-AF65-F5344CB8AC3E}">
-        <p14:creationId xmlns:p14="http://schemas.microsoft.com/office/powerpoint/2010/main" val="1532858937"/>
+        <p14:creationId xmlns:p14="http://schemas.microsoft.com/office/powerpoint/2010/main" val="1478725367"/>
       </p:ext>
     </p:extLst>
   </p:cSld>
@@ -7470,15 +7610,14 @@
         </p:nvSpPr>
         <p:spPr/>
         <p:txBody>
-          <a:bodyPr>
-            <a:normAutofit fontScale="90000"/>
-          </a:bodyPr>
-          <a:lstStyle/>
-          <a:p>
-            <a:r>
-              <a:rPr lang="en-US" dirty="0"/>
-              <a:t>NEXT STEPS: CLOSING THE FEEDBACK LOOP</a:t>
-            </a:r>
+          <a:bodyPr/>
+          <a:lstStyle/>
+          <a:p>
+            <a:r>
+              <a:rPr lang="en-US" dirty="0" smtClean="0"/>
+              <a:t>POST-DEMO POINTERS</a:t>
+            </a:r>
+            <a:endParaRPr lang="en-US" dirty="0"/>
           </a:p>
         </p:txBody>
       </p:sp>
@@ -7498,48 +7637,45 @@
           <a:lstStyle/>
           <a:p>
             <a:r>
+              <a:rPr lang="en-US" dirty="0" smtClean="0"/>
+              <a:t>POJO </a:t>
+            </a:r>
+            <a:r>
+              <a:rPr lang="en-US" dirty="0" err="1" smtClean="0"/>
+              <a:t>Javadoc</a:t>
+            </a:r>
+            <a:endParaRPr lang="en-US" dirty="0" smtClean="0"/>
+          </a:p>
+          <a:p>
+            <a:pPr lvl="1"/>
+            <a:r>
               <a:rPr lang="en-US" dirty="0"/>
-              <a:t>Scoring</a:t>
-            </a:r>
-          </a:p>
-          <a:p>
-            <a:pPr lvl="1"/>
+              <a:t>http://h2o-release.s3.amazonaws.com/h2o/</a:t>
+            </a:r>
+            <a:r>
+              <a:rPr lang="en-US" dirty="0" err="1"/>
+              <a:t>rel-tibshirani</a:t>
+            </a:r>
+            <a:r>
+              <a:rPr lang="en-US" dirty="0" smtClean="0"/>
+              <a:t>/3/</a:t>
+            </a:r>
             <a:r>
               <a:rPr lang="en-US" dirty="0"/>
-              <a:t>Judging how good the predictions really are</a:t>
-            </a:r>
-          </a:p>
-          <a:p>
-            <a:pPr lvl="1"/>
+              <a:t>docs-website/h2o-genmodel/</a:t>
+            </a:r>
+            <a:r>
+              <a:rPr lang="en-US" dirty="0" err="1"/>
+              <a:t>javadoc</a:t>
+            </a:r>
             <a:r>
               <a:rPr lang="en-US" dirty="0"/>
-              <a:t>Need to get the correct answers from somewhere</a:t>
-            </a:r>
-          </a:p>
-          <a:p>
-            <a:endParaRPr lang="en-US" dirty="0"/>
-          </a:p>
-          <a:p>
-            <a:r>
-              <a:rPr lang="en-US" dirty="0"/>
-              <a:t>Storing predictions (and the correct answers)</a:t>
-            </a:r>
-          </a:p>
-          <a:p>
-            <a:pPr lvl="1"/>
-            <a:r>
-              <a:rPr lang="en-US" dirty="0"/>
-              <a:t>Often Hadoop</a:t>
-            </a:r>
-          </a:p>
-          <a:p>
-            <a:pPr lvl="1"/>
-            <a:r>
-              <a:rPr lang="en-US" dirty="0"/>
-              <a:t>This can be a lot of work to organize</a:t>
-            </a:r>
-          </a:p>
-          <a:p>
+              <a:t>/</a:t>
+            </a:r>
+            <a:r>
+              <a:rPr lang="en-US" dirty="0" err="1"/>
+              <a:t>index.html</a:t>
+            </a:r>
             <a:endParaRPr lang="en-US" dirty="0"/>
           </a:p>
         </p:txBody>
@@ -7547,7 +7683,7 @@
     </p:spTree>
     <p:extLst>
       <p:ext uri="{BB962C8B-B14F-4D97-AF65-F5344CB8AC3E}">
-        <p14:creationId xmlns:p14="http://schemas.microsoft.com/office/powerpoint/2010/main" val="3530954165"/>
+        <p14:creationId xmlns:p14="http://schemas.microsoft.com/office/powerpoint/2010/main" val="1532858937"/>
       </p:ext>
     </p:extLst>
   </p:cSld>
@@ -7600,7 +7736,7 @@
           <a:p>
             <a:r>
               <a:rPr lang="en-US" dirty="0"/>
-              <a:t>NEXT STEPS: RETRAINING AND DEPLOYING</a:t>
+              <a:t>NEXT STEPS: CLOSING THE FEEDBACK LOOP</a:t>
             </a:r>
           </a:p>
         </p:txBody>
@@ -7617,66 +7753,49 @@
         </p:nvSpPr>
         <p:spPr/>
         <p:txBody>
-          <a:bodyPr>
-            <a:normAutofit fontScale="92500"/>
-          </a:bodyPr>
+          <a:bodyPr/>
           <a:lstStyle/>
           <a:p>
             <a:r>
               <a:rPr lang="en-US" dirty="0"/>
-              <a:t>Model update frequency</a:t>
+              <a:t>Scoring</a:t>
             </a:r>
           </a:p>
           <a:p>
             <a:pPr lvl="1"/>
             <a:r>
               <a:rPr lang="en-US" dirty="0"/>
-              <a:t>Need depends on the use case</a:t>
+              <a:t>Judging how good the predictions really are</a:t>
             </a:r>
           </a:p>
           <a:p>
             <a:pPr lvl="1"/>
             <a:r>
               <a:rPr lang="en-US" dirty="0"/>
-              <a:t>Hourly, daily, monthly?</a:t>
+              <a:t>Need to get the correct answers from somewhere</a:t>
+            </a:r>
+          </a:p>
+          <a:p>
+            <a:endParaRPr lang="en-US" dirty="0"/>
+          </a:p>
+          <a:p>
+            <a:r>
+              <a:rPr lang="en-US" dirty="0"/>
+              <a:t>Storing predictions (and the correct answers)</a:t>
             </a:r>
           </a:p>
           <a:p>
             <a:pPr lvl="1"/>
             <a:r>
               <a:rPr lang="en-US" dirty="0"/>
-              <a:t>Time cost of training the model is a factor</a:t>
+              <a:t>Often Hadoop</a:t>
             </a:r>
           </a:p>
           <a:p>
             <a:pPr lvl="1"/>
-            <a:endParaRPr lang="en-US" dirty="0"/>
-          </a:p>
-          <a:p>
             <a:r>
               <a:rPr lang="en-US" dirty="0"/>
-              <a:t>Hot swapping the model</a:t>
-            </a:r>
-          </a:p>
-          <a:p>
-            <a:pPr lvl="1"/>
-            <a:r>
-              <a:rPr lang="en-US" dirty="0"/>
-              <a:t>Separating front-end and back-end makes this easier</a:t>
-            </a:r>
-          </a:p>
-          <a:p>
-            <a:pPr lvl="1"/>
-            <a:r>
-              <a:rPr lang="en-US" dirty="0"/>
-              <a:t>Java reflection for in-process hot-swap</a:t>
-            </a:r>
-          </a:p>
-          <a:p>
-            <a:pPr lvl="1"/>
-            <a:r>
-              <a:rPr lang="en-US" dirty="0"/>
-              <a:t>Load balancer for servlet container hot-swap</a:t>
+              <a:t>This can be a lot of work to organize</a:t>
             </a:r>
           </a:p>
           <a:p>
@@ -7687,7 +7806,7 @@
     </p:spTree>
     <p:extLst>
       <p:ext uri="{BB962C8B-B14F-4D97-AF65-F5344CB8AC3E}">
-        <p14:creationId xmlns:p14="http://schemas.microsoft.com/office/powerpoint/2010/main" val="3348186429"/>
+        <p14:creationId xmlns:p14="http://schemas.microsoft.com/office/powerpoint/2010/main" val="3530954165"/>
       </p:ext>
     </p:extLst>
   </p:cSld>
@@ -7733,14 +7852,15 @@
         </p:nvSpPr>
         <p:spPr/>
         <p:txBody>
-          <a:bodyPr/>
-          <a:lstStyle/>
-          <a:p>
-            <a:r>
-              <a:rPr lang="en-US" dirty="0" smtClean="0"/>
-              <a:t>RELATED EXAMPLES</a:t>
-            </a:r>
-            <a:endParaRPr lang="en-US" dirty="0"/>
+          <a:bodyPr>
+            <a:normAutofit fontScale="90000"/>
+          </a:bodyPr>
+          <a:lstStyle/>
+          <a:p>
+            <a:r>
+              <a:rPr lang="en-US" dirty="0"/>
+              <a:t>NEXT STEPS: RETRAINING AND DEPLOYING</a:t>
+            </a:r>
           </a:p>
         </p:txBody>
       </p:sp>
@@ -7762,110 +7882,84 @@
           <a:lstStyle/>
           <a:p>
             <a:r>
-              <a:rPr lang="en-US" dirty="0" smtClean="0"/>
-              <a:t>H2O Generated Model POJO in a Storm bolt</a:t>
+              <a:rPr lang="en-US" dirty="0"/>
+              <a:t>Model update frequency</a:t>
             </a:r>
           </a:p>
           <a:p>
             <a:pPr lvl="1"/>
             <a:r>
-              <a:rPr lang="en-US" dirty="0" err="1" smtClean="0"/>
-              <a:t>GitHub</a:t>
-            </a:r>
-            <a:r>
-              <a:rPr lang="en-US" dirty="0" smtClean="0"/>
-              <a:t>:  h2oai/</a:t>
-            </a:r>
-            <a:r>
               <a:rPr lang="en-US" dirty="0"/>
-              <a:t>h2o-world-2015-</a:t>
-            </a:r>
-            <a:r>
-              <a:rPr lang="en-US" dirty="0" smtClean="0"/>
-              <a:t>training</a:t>
-            </a:r>
+              <a:t>Need depends on the use case</a:t>
+            </a:r>
+          </a:p>
+          <a:p>
+            <a:pPr lvl="1"/>
+            <a:r>
+              <a:rPr lang="en-US" dirty="0"/>
+              <a:t>Hourly, daily, monthly?</a:t>
+            </a:r>
+          </a:p>
+          <a:p>
+            <a:pPr lvl="1"/>
+            <a:r>
+              <a:rPr lang="en-US" dirty="0"/>
+              <a:t>Time cost of training the model is a factor</a:t>
+            </a:r>
+          </a:p>
+          <a:p>
+            <a:pPr lvl="1"/>
             <a:endParaRPr lang="en-US" dirty="0"/>
           </a:p>
           <a:p>
+            <a:r>
+              <a:rPr lang="en-US" dirty="0"/>
+              <a:t>Hot swapping the model</a:t>
+            </a:r>
+          </a:p>
+          <a:p>
             <a:pPr lvl="1"/>
             <a:r>
-              <a:rPr lang="en-US" dirty="0" smtClean="0"/>
-              <a:t>tutorials</a:t>
-            </a:r>
-            <a:r>
               <a:rPr lang="en-US" dirty="0"/>
-              <a:t>/streaming/storm</a:t>
-            </a:r>
-            <a:endParaRPr lang="en-US" dirty="0" smtClean="0"/>
-          </a:p>
-          <a:p>
-            <a:endParaRPr lang="en-US" dirty="0" smtClean="0"/>
-          </a:p>
-          <a:p>
-            <a:r>
-              <a:rPr lang="en-US" dirty="0" smtClean="0"/>
-              <a:t>H2O Generated Model POJO in Spark Streaming</a:t>
+              <a:t>Separating front-end and back-end makes this easier</a:t>
             </a:r>
           </a:p>
           <a:p>
             <a:pPr lvl="1"/>
             <a:r>
-              <a:rPr lang="en-US" dirty="0" err="1" smtClean="0"/>
-              <a:t>GitHub</a:t>
-            </a:r>
-            <a:r>
-              <a:rPr lang="en-US" dirty="0" smtClean="0"/>
-              <a:t>: h2oai</a:t>
-            </a:r>
-            <a:r>
               <a:rPr lang="en-US" dirty="0"/>
-              <a:t>/sparkling-</a:t>
-            </a:r>
-            <a:r>
-              <a:rPr lang="en-US" dirty="0" smtClean="0"/>
-              <a:t>water</a:t>
+              <a:t>Java reflection for in-process hot-swap</a:t>
             </a:r>
           </a:p>
           <a:p>
             <a:pPr lvl="1"/>
             <a:r>
               <a:rPr lang="en-US" dirty="0"/>
-              <a:t>examples/</a:t>
-            </a:r>
-            <a:r>
-              <a:rPr lang="en-US" dirty="0" err="1"/>
-              <a:t>src</a:t>
-            </a:r>
-            <a:r>
-              <a:rPr lang="en-US" dirty="0"/>
-              <a:t>/main/</a:t>
-            </a:r>
-            <a:r>
-              <a:rPr lang="en-US" dirty="0" err="1"/>
-              <a:t>scala</a:t>
-            </a:r>
-            <a:r>
-              <a:rPr lang="en-US" dirty="0"/>
-              <a:t>/org/apache/spark/examples/h2o/</a:t>
-            </a:r>
-            <a:r>
-              <a:rPr lang="en-US" dirty="0" err="1"/>
-              <a:t>CraigslistJobTitlesStreamingApp.scala</a:t>
-            </a:r>
-            <a:endParaRPr lang="en-US" dirty="0" smtClean="0"/>
+              <a:t>Load balancer for servlet container hot-swap</a:t>
+            </a:r>
+          </a:p>
+          <a:p>
+            <a:endParaRPr lang="en-US" dirty="0"/>
           </a:p>
         </p:txBody>
       </p:sp>
     </p:spTree>
     <p:extLst>
       <p:ext uri="{BB962C8B-B14F-4D97-AF65-F5344CB8AC3E}">
-        <p14:creationId xmlns:p14="http://schemas.microsoft.com/office/powerpoint/2010/main" val="3818036524"/>
+        <p14:creationId xmlns:p14="http://schemas.microsoft.com/office/powerpoint/2010/main" val="3348186429"/>
       </p:ext>
     </p:extLst>
   </p:cSld>
   <p:clrMapOvr>
     <a:masterClrMapping/>
   </p:clrMapOvr>
+  <p:timing>
+    <p:tnLst>
+      <p:par>
+        <p:cTn xmlns:p14="http://schemas.microsoft.com/office/powerpoint/2010/main" id="1" dur="indefinite" restart="never" nodeType="tmRoot"/>
+      </p:par>
+    </p:tnLst>
+  </p:timing>
 </p:sld>
 </file>
 
@@ -7903,7 +7997,7 @@
           <a:p>
             <a:r>
               <a:rPr lang="en-US" dirty="0" smtClean="0"/>
-              <a:t>BONUS APP</a:t>
+              <a:t>RELATED EXAMPLES</a:t>
             </a:r>
             <a:endParaRPr lang="en-US" dirty="0"/>
           </a:p>
@@ -7922,110 +8016,109 @@
         <p:spPr/>
         <p:txBody>
           <a:bodyPr>
-            <a:normAutofit fontScale="92500" lnSpcReduction="10000"/>
+            <a:normAutofit fontScale="92500"/>
           </a:bodyPr>
           <a:lstStyle/>
           <a:p>
             <a:r>
               <a:rPr lang="en-US" dirty="0" smtClean="0"/>
-              <a:t>“Ask Craig” app</a:t>
-            </a:r>
-          </a:p>
-          <a:p>
-            <a:r>
-              <a:rPr lang="en-US" dirty="0" smtClean="0">
-                <a:hlinkClick r:id="rId2"/>
-              </a:rPr>
-              <a:t>http</a:t>
-            </a:r>
-            <a:r>
-              <a:rPr lang="en-US" dirty="0">
-                <a:hlinkClick r:id="rId2"/>
-              </a:rPr>
-              <a:t>://</a:t>
-            </a:r>
-            <a:r>
-              <a:rPr lang="en-US" dirty="0" smtClean="0">
-                <a:hlinkClick r:id="rId2"/>
-              </a:rPr>
-              <a:t>classify.h2o.ai</a:t>
-            </a:r>
-            <a:endParaRPr lang="en-US" dirty="0" smtClean="0"/>
-          </a:p>
-          <a:p>
-            <a:r>
-              <a:rPr lang="en-US" dirty="0" smtClean="0"/>
-              <a:t>Uses Spark word2vec, H2O </a:t>
-            </a:r>
-            <a:r>
-              <a:rPr lang="en-US" dirty="0" err="1" smtClean="0"/>
-              <a:t>gbm</a:t>
-            </a:r>
-            <a:endParaRPr lang="en-US" dirty="0" smtClean="0"/>
-          </a:p>
-          <a:p>
-            <a:r>
-              <a:rPr lang="en-US" dirty="0" smtClean="0"/>
-              <a:t>Multinomial classification problem</a:t>
+              <a:t>H2O Generated Model POJO in a Storm bolt</a:t>
             </a:r>
           </a:p>
           <a:p>
             <a:pPr lvl="1"/>
-            <a:r>
-              <a:rPr lang="en-US" dirty="0" smtClean="0"/>
-              <a:t>Given the words for a new job posting, figure out the right category for the job</a:t>
-            </a:r>
-          </a:p>
-          <a:p>
-            <a:r>
-              <a:rPr lang="en-US" dirty="0" smtClean="0"/>
-              <a:t>See H2O.ai </a:t>
-            </a:r>
-            <a:r>
-              <a:rPr lang="en-US" dirty="0"/>
-              <a:t>blog about this Sparkling Water app</a:t>
-            </a:r>
-          </a:p>
-          <a:p>
-            <a:pPr lvl="1"/>
-            <a:r>
-              <a:rPr lang="en-US" dirty="0"/>
-              <a:t>Do a web search for “h2o ask </a:t>
-            </a:r>
-            <a:r>
-              <a:rPr lang="en-US" dirty="0" err="1"/>
-              <a:t>craig</a:t>
-            </a:r>
-            <a:r>
-              <a:rPr lang="en-US" dirty="0" smtClean="0"/>
-              <a:t>”</a:t>
-            </a:r>
-          </a:p>
-          <a:p>
             <a:r>
               <a:rPr lang="en-US" dirty="0" err="1" smtClean="0"/>
               <a:t>GitHub</a:t>
             </a:r>
             <a:r>
               <a:rPr lang="en-US" dirty="0" smtClean="0"/>
-              <a:t>: h2oai/app</a:t>
+              <a:t>:  h2oai/</a:t>
             </a:r>
             <a:r>
               <a:rPr lang="en-US" dirty="0"/>
-              <a:t>-ask-</a:t>
+              <a:t>h2o-world-2015-</a:t>
+            </a:r>
+            <a:r>
+              <a:rPr lang="en-US" dirty="0" smtClean="0"/>
+              <a:t>training</a:t>
+            </a:r>
+            <a:endParaRPr lang="en-US" dirty="0"/>
+          </a:p>
+          <a:p>
+            <a:pPr lvl="1"/>
+            <a:r>
+              <a:rPr lang="en-US" dirty="0" smtClean="0"/>
+              <a:t>tutorials</a:t>
+            </a:r>
+            <a:r>
+              <a:rPr lang="en-US" dirty="0"/>
+              <a:t>/streaming/storm</a:t>
+            </a:r>
+            <a:endParaRPr lang="en-US" dirty="0" smtClean="0"/>
+          </a:p>
+          <a:p>
+            <a:endParaRPr lang="en-US" dirty="0" smtClean="0"/>
+          </a:p>
+          <a:p>
+            <a:r>
+              <a:rPr lang="en-US" dirty="0" smtClean="0"/>
+              <a:t>H2O Generated Model POJO in Spark Streaming</a:t>
+            </a:r>
+          </a:p>
+          <a:p>
+            <a:pPr lvl="1"/>
+            <a:r>
+              <a:rPr lang="en-US" dirty="0" err="1" smtClean="0"/>
+              <a:t>GitHub</a:t>
+            </a:r>
+            <a:r>
+              <a:rPr lang="en-US" dirty="0" smtClean="0"/>
+              <a:t>: h2oai</a:t>
+            </a:r>
+            <a:r>
+              <a:rPr lang="en-US" dirty="0"/>
+              <a:t>/sparkling-</a:t>
+            </a:r>
+            <a:r>
+              <a:rPr lang="en-US" dirty="0" smtClean="0"/>
+              <a:t>water</a:t>
+            </a:r>
+          </a:p>
+          <a:p>
+            <a:pPr lvl="1"/>
+            <a:r>
+              <a:rPr lang="en-US" dirty="0"/>
+              <a:t>examples/</a:t>
             </a:r>
             <a:r>
               <a:rPr lang="en-US" dirty="0" err="1"/>
-              <a:t>craig</a:t>
-            </a:r>
-            <a:endParaRPr lang="en-US" dirty="0"/>
+              <a:t>src</a:t>
+            </a:r>
+            <a:r>
+              <a:rPr lang="en-US" dirty="0"/>
+              <a:t>/main/</a:t>
+            </a:r>
+            <a:r>
+              <a:rPr lang="en-US" dirty="0" err="1"/>
+              <a:t>scala</a:t>
+            </a:r>
+            <a:r>
+              <a:rPr lang="en-US" dirty="0"/>
+              <a:t>/org/apache/spark/examples/h2o/</a:t>
+            </a:r>
+            <a:r>
+              <a:rPr lang="en-US" dirty="0" err="1"/>
+              <a:t>CraigslistJobTitlesStreamingApp.scala</a:t>
+            </a:r>
+            <a:endParaRPr lang="en-US" dirty="0" smtClean="0"/>
           </a:p>
         </p:txBody>
       </p:sp>
     </p:spTree>
     <p:extLst>
       <p:ext uri="{BB962C8B-B14F-4D97-AF65-F5344CB8AC3E}">
-        <p14:creationId xmlns:p14="http://schemas.microsoft.com/office/powerpoint/2010/main" val="1740477580"/>
+        <p14:creationId xmlns:p14="http://schemas.microsoft.com/office/powerpoint/2010/main" val="3818036524"/>
       </p:ext>
     </p:extLst>
   </p:cSld>
@@ -8109,13 +8202,8 @@
             </a:pPr>
             <a:r>
               <a:rPr lang="en-US" dirty="0" smtClean="0"/>
-              <a:t>Q:		What is a Smarter Application</a:t>
-            </a:r>
-            <a:r>
-              <a:rPr lang="en-US" dirty="0" smtClean="0"/>
-              <a:t>?</a:t>
-            </a:r>
-            <a:endParaRPr lang="en-US" dirty="0" smtClean="0"/>
+              <a:t>Q:		What is a Smarter Application?</a:t>
+            </a:r>
           </a:p>
           <a:p>
             <a:pPr marL="0" indent="0">
@@ -8136,11 +8224,7 @@
             </a:r>
             <a:r>
               <a:rPr lang="en-US" dirty="0" smtClean="0"/>
-              <a:t>	[From rules-based to model-based</a:t>
-            </a:r>
-            <a:r>
-              <a:rPr lang="en-US" dirty="0" smtClean="0"/>
-              <a:t>]</a:t>
+              <a:t>	[From rules-based to model-based]</a:t>
             </a:r>
           </a:p>
           <a:p>
@@ -8199,7 +8283,6 @@
               <a:rPr lang="en-US" sz="2400" dirty="0" smtClean="0"/>
               <a:t> adding Machine Learning to apps</a:t>
             </a:r>
-            <a:endParaRPr lang="en-US" sz="2400" dirty="0" smtClean="0"/>
           </a:p>
           <a:p>
             <a:pPr lvl="1"/>
@@ -8219,7 +8302,6 @@
               <a:rPr lang="en-US" sz="2400" dirty="0" smtClean="0"/>
               <a:t>putting models into production</a:t>
             </a:r>
-            <a:endParaRPr lang="en-US" sz="2400" dirty="0" smtClean="0"/>
           </a:p>
         </p:txBody>
       </p:sp>
@@ -8277,6 +8359,179 @@
           <a:p>
             <a:r>
               <a:rPr lang="en-US" dirty="0" smtClean="0"/>
+              <a:t>BONUS APP</a:t>
+            </a:r>
+            <a:endParaRPr lang="en-US" dirty="0"/>
+          </a:p>
+        </p:txBody>
+      </p:sp>
+      <p:sp>
+        <p:nvSpPr>
+          <p:cNvPr id="3" name="Content Placeholder 2"/>
+          <p:cNvSpPr>
+            <a:spLocks noGrp="1"/>
+          </p:cNvSpPr>
+          <p:nvPr>
+            <p:ph idx="1"/>
+          </p:nvPr>
+        </p:nvSpPr>
+        <p:spPr/>
+        <p:txBody>
+          <a:bodyPr>
+            <a:normAutofit fontScale="92500" lnSpcReduction="10000"/>
+          </a:bodyPr>
+          <a:lstStyle/>
+          <a:p>
+            <a:r>
+              <a:rPr lang="en-US" dirty="0" smtClean="0"/>
+              <a:t>“Ask Craig” app</a:t>
+            </a:r>
+          </a:p>
+          <a:p>
+            <a:r>
+              <a:rPr lang="en-US" dirty="0" smtClean="0">
+                <a:hlinkClick r:id="rId2"/>
+              </a:rPr>
+              <a:t>http</a:t>
+            </a:r>
+            <a:r>
+              <a:rPr lang="en-US" dirty="0">
+                <a:hlinkClick r:id="rId2"/>
+              </a:rPr>
+              <a:t>://</a:t>
+            </a:r>
+            <a:r>
+              <a:rPr lang="en-US" dirty="0" smtClean="0">
+                <a:hlinkClick r:id="rId2"/>
+              </a:rPr>
+              <a:t>classify.h2o.ai</a:t>
+            </a:r>
+            <a:endParaRPr lang="en-US" dirty="0" smtClean="0"/>
+          </a:p>
+          <a:p>
+            <a:r>
+              <a:rPr lang="en-US" dirty="0" smtClean="0"/>
+              <a:t>Uses Spark word2vec, H2O </a:t>
+            </a:r>
+            <a:r>
+              <a:rPr lang="en-US" dirty="0" err="1" smtClean="0"/>
+              <a:t>gbm</a:t>
+            </a:r>
+            <a:endParaRPr lang="en-US" dirty="0" smtClean="0"/>
+          </a:p>
+          <a:p>
+            <a:r>
+              <a:rPr lang="en-US" dirty="0" smtClean="0"/>
+              <a:t>Multinomial classification problem</a:t>
+            </a:r>
+          </a:p>
+          <a:p>
+            <a:pPr lvl="1"/>
+            <a:r>
+              <a:rPr lang="en-US" dirty="0" smtClean="0"/>
+              <a:t>Given the words for a new job posting, figure out the right category for the job</a:t>
+            </a:r>
+          </a:p>
+          <a:p>
+            <a:r>
+              <a:rPr lang="en-US" dirty="0" smtClean="0"/>
+              <a:t>See H2O.ai </a:t>
+            </a:r>
+            <a:r>
+              <a:rPr lang="en-US" dirty="0"/>
+              <a:t>blog about this Sparkling Water app</a:t>
+            </a:r>
+          </a:p>
+          <a:p>
+            <a:pPr lvl="1"/>
+            <a:r>
+              <a:rPr lang="en-US" dirty="0"/>
+              <a:t>Do a web search for “h2o ask </a:t>
+            </a:r>
+            <a:r>
+              <a:rPr lang="en-US" dirty="0" err="1"/>
+              <a:t>craig</a:t>
+            </a:r>
+            <a:r>
+              <a:rPr lang="en-US" dirty="0" smtClean="0"/>
+              <a:t>”</a:t>
+            </a:r>
+          </a:p>
+          <a:p>
+            <a:r>
+              <a:rPr lang="en-US" dirty="0" err="1" smtClean="0"/>
+              <a:t>GitHub</a:t>
+            </a:r>
+            <a:r>
+              <a:rPr lang="en-US" dirty="0" smtClean="0"/>
+              <a:t>: h2oai/app</a:t>
+            </a:r>
+            <a:r>
+              <a:rPr lang="en-US" dirty="0"/>
+              <a:t>-ask-</a:t>
+            </a:r>
+            <a:r>
+              <a:rPr lang="en-US" dirty="0" err="1"/>
+              <a:t>craig</a:t>
+            </a:r>
+            <a:endParaRPr lang="en-US" dirty="0"/>
+          </a:p>
+        </p:txBody>
+      </p:sp>
+    </p:spTree>
+    <p:extLst>
+      <p:ext uri="{BB962C8B-B14F-4D97-AF65-F5344CB8AC3E}">
+        <p14:creationId xmlns:p14="http://schemas.microsoft.com/office/powerpoint/2010/main" val="1740477580"/>
+      </p:ext>
+    </p:extLst>
+  </p:cSld>
+  <p:clrMapOvr>
+    <a:masterClrMapping/>
+  </p:clrMapOvr>
+  <p:timing>
+    <p:tnLst>
+      <p:par>
+        <p:cTn xmlns:p14="http://schemas.microsoft.com/office/powerpoint/2010/main" id="1" dur="indefinite" restart="never" nodeType="tmRoot"/>
+      </p:par>
+    </p:tnLst>
+  </p:timing>
+</p:sld>
+</file>
+
+<file path=ppt/slides/slide21.xml><?xml version="1.0" encoding="utf-8"?>
+<p:sld xmlns:a="http://schemas.openxmlformats.org/drawingml/2006/main" xmlns:r="http://schemas.openxmlformats.org/officeDocument/2006/relationships" xmlns:p="http://schemas.openxmlformats.org/presentationml/2006/main">
+  <p:cSld>
+    <p:spTree>
+      <p:nvGrpSpPr>
+        <p:cNvPr id="1" name=""/>
+        <p:cNvGrpSpPr/>
+        <p:nvPr/>
+      </p:nvGrpSpPr>
+      <p:grpSpPr>
+        <a:xfrm>
+          <a:off x="0" y="0"/>
+          <a:ext cx="0" cy="0"/>
+          <a:chOff x="0" y="0"/>
+          <a:chExt cx="0" cy="0"/>
+        </a:xfrm>
+      </p:grpSpPr>
+      <p:sp>
+        <p:nvSpPr>
+          <p:cNvPr id="2" name="Title 1"/>
+          <p:cNvSpPr>
+            <a:spLocks noGrp="1"/>
+          </p:cNvSpPr>
+          <p:nvPr>
+            <p:ph type="title"/>
+          </p:nvPr>
+        </p:nvSpPr>
+        <p:spPr/>
+        <p:txBody>
+          <a:bodyPr/>
+          <a:lstStyle/>
+          <a:p>
+            <a:r>
+              <a:rPr lang="en-US" dirty="0" smtClean="0"/>
               <a:t>Q &amp; A</a:t>
             </a:r>
             <a:endParaRPr lang="en-US" dirty="0"/>
@@ -8348,6 +8603,13 @@
   <p:clrMapOvr>
     <a:masterClrMapping/>
   </p:clrMapOvr>
+  <p:timing>
+    <p:tnLst>
+      <p:par>
+        <p:cTn xmlns:p14="http://schemas.microsoft.com/office/powerpoint/2010/main" id="1" dur="indefinite" restart="never" nodeType="tmRoot"/>
+      </p:par>
+    </p:tnLst>
+  </p:timing>
 </p:sld>
 </file>
 
@@ -8434,18 +8696,12 @@
               <a:rPr lang="en-US" dirty="0" smtClean="0"/>
               <a:t>utorials/building-a-smarter-application</a:t>
             </a:r>
-            <a:endParaRPr lang="en-US" dirty="0" smtClean="0"/>
           </a:p>
           <a:p>
             <a:r>
               <a:rPr lang="en-US" dirty="0" smtClean="0"/>
-              <a:t>Source </a:t>
-            </a:r>
-            <a:r>
-              <a:rPr lang="en-US" dirty="0" smtClean="0"/>
-              <a:t>code</a:t>
-            </a:r>
-            <a:endParaRPr lang="en-US" dirty="0" smtClean="0"/>
+              <a:t>Source code</a:t>
+            </a:r>
           </a:p>
           <a:p>
             <a:pPr lvl="1"/>
@@ -8455,11 +8711,7 @@
             </a:r>
             <a:r>
               <a:rPr lang="en-US" dirty="0" smtClean="0"/>
-              <a:t> h2oai</a:t>
-            </a:r>
-            <a:r>
-              <a:rPr lang="en-US" dirty="0" smtClean="0"/>
-              <a:t>/app-consumer-loan	</a:t>
+              <a:t> h2oai/app-consumer-loan	</a:t>
             </a:r>
           </a:p>
           <a:p>
@@ -8473,13 +8725,8 @@
             </a:r>
             <a:r>
               <a:rPr lang="en-US" dirty="0" smtClean="0"/>
-              <a:t> </a:t>
-            </a:r>
-            <a:r>
-              <a:rPr lang="en-US" dirty="0" smtClean="0"/>
-              <a:t>release (on USB)</a:t>
-            </a:r>
-            <a:endParaRPr lang="en-US" dirty="0" smtClean="0"/>
+              <a:t> release (on USB)</a:t>
+            </a:r>
           </a:p>
           <a:p>
             <a:pPr lvl="1"/>
@@ -8510,8 +8757,20 @@
               <a:t>rel-tibshirani</a:t>
             </a:r>
             <a:r>
+              <a:rPr lang="en-US" dirty="0" smtClean="0"/>
+              <a:t>/</a:t>
+            </a:r>
+            <a:r>
               <a:rPr lang="en-US" dirty="0"/>
-              <a:t>/2/docs-website/h2o-genmodel/</a:t>
+              <a:t>3</a:t>
+            </a:r>
+            <a:r>
+              <a:rPr lang="en-US" dirty="0" smtClean="0"/>
+              <a:t>/</a:t>
+            </a:r>
+            <a:r>
+              <a:rPr lang="en-US" dirty="0"/>
+              <a:t>docs-website/h2o-genmodel/</a:t>
             </a:r>
             <a:r>
               <a:rPr lang="en-US" dirty="0" err="1"/>
@@ -8615,15 +8874,7 @@
           <a:p>
             <a:r>
               <a:rPr lang="en-US" dirty="0" smtClean="0"/>
-              <a:t>The </a:t>
-            </a:r>
-            <a:r>
-              <a:rPr lang="en-US" dirty="0" smtClean="0"/>
-              <a:t>end-user </a:t>
-            </a:r>
-            <a:r>
-              <a:rPr lang="en-US" dirty="0" smtClean="0"/>
-              <a:t>is applying for a loan</a:t>
+              <a:t>The end-user is applying for a loan</a:t>
             </a:r>
           </a:p>
           <a:p>

</xml_diff>